<commit_message>
NOJIRA Updated to reflect feedback from Services Team review of 2009-06-12.
</commit_message>
<xml_diff>
--- a/docs/allteam-061409-toronto/Toronto_Services_REST_APIs.pptx
+++ b/docs/allteam-061409-toronto/Toronto_Services_REST_APIs.pptx
@@ -4221,18 +4221,9 @@
                 </a:solidFill>
                 <a:latin typeface="Arial" pitchFamily="80" charset="0"/>
               </a:rPr>
-              <a:t>  (</a:t>
-            </a:r>
-            <a:r>
-              <a:rPr lang="en-US" sz="2800" smtClean="0">
-                <a:solidFill>
-                  <a:srgbClr val="000000"/>
-                </a:solidFill>
-                <a:latin typeface="Arial" pitchFamily="80" charset="0"/>
-              </a:rPr>
-              <a:t>cont’d)</a:t>
-            </a:r>
-            <a:endParaRPr lang="en-US" sz="2400" b="1" smtClean="0">
+              <a:t>  (cont’d)</a:t>
+            </a:r>
+            <a:endParaRPr lang="en-US" sz="2400" b="1" dirty="0" smtClean="0">
               <a:solidFill>
                 <a:srgbClr val="3333CC"/>
               </a:solidFill>
@@ -4250,13 +4241,22 @@
               <a:buNone/>
             </a:pPr>
             <a:r>
+              <a:rPr lang="en-US" sz="2400" i="1" dirty="0" smtClean="0">
+                <a:solidFill>
+                  <a:srgbClr val="000000"/>
+                </a:solidFill>
+                <a:latin typeface="Arial" pitchFamily="80" charset="0"/>
+              </a:rPr>
+              <a:t>If </a:t>
+            </a:r>
+            <a:r>
               <a:rPr lang="en-US" sz="2400" dirty="0" smtClean="0">
                 <a:solidFill>
                   <a:srgbClr val="000000"/>
                 </a:solidFill>
                 <a:latin typeface="Arial" pitchFamily="80" charset="0"/>
               </a:rPr>
-              <a:t>If we model searches as resources:</a:t>
+              <a:t>we model searches as resources:</a:t>
             </a:r>
           </a:p>
           <a:p>
@@ -4431,7 +4431,34 @@
                 </a:solidFill>
                 <a:latin typeface="Arial" pitchFamily="80" charset="0"/>
               </a:rPr>
-              <a:t>Searches might thus be saved, shared …</a:t>
+              <a:t>Searches </a:t>
+            </a:r>
+            <a:r>
+              <a:rPr lang="en-US" sz="2400" i="1" dirty="0" smtClean="0">
+                <a:solidFill>
+                  <a:srgbClr val="000000"/>
+                </a:solidFill>
+                <a:latin typeface="Arial" pitchFamily="80" charset="0"/>
+              </a:rPr>
+              <a:t>might </a:t>
+            </a:r>
+            <a:r>
+              <a:rPr lang="en-US" sz="2400" dirty="0" smtClean="0">
+                <a:solidFill>
+                  <a:srgbClr val="000000"/>
+                </a:solidFill>
+                <a:latin typeface="Arial" pitchFamily="80" charset="0"/>
+              </a:rPr>
+              <a:t>thus be saved, shared </a:t>
+            </a:r>
+            <a:r>
+              <a:rPr lang="en-US" sz="2400" dirty="0" smtClean="0">
+                <a:solidFill>
+                  <a:srgbClr val="000000"/>
+                </a:solidFill>
+                <a:latin typeface="Arial" pitchFamily="80" charset="0"/>
+              </a:rPr>
+              <a:t>…</a:t>
             </a:r>
           </a:p>
         </p:txBody>
@@ -4999,7 +5026,47 @@
                 <a:latin typeface="Courier New"/>
                 <a:cs typeface="Courier New"/>
               </a:rPr>
-              <a:t>  &lt;code&gt;Mandatory code&lt;/code&gt;</a:t>
+              <a:t>  &lt;code</a:t>
+            </a:r>
+            <a:r>
+              <a:rPr lang="en-US" sz="2200" b="1" dirty="0" smtClean="0">
+                <a:solidFill>
+                  <a:srgbClr val="000000"/>
+                </a:solidFill>
+                <a:latin typeface="Courier New"/>
+                <a:cs typeface="Courier New"/>
+              </a:rPr>
+              <a:t>&gt;</a:t>
+            </a:r>
+            <a:r>
+              <a:rPr lang="en-US" sz="2200" b="1" dirty="0" smtClean="0">
+                <a:solidFill>
+                  <a:srgbClr val="3333CC"/>
+                </a:solidFill>
+                <a:latin typeface="Courier New"/>
+                <a:cs typeface="Courier New"/>
+              </a:rPr>
+              <a:t>{Mandatory code}</a:t>
+            </a:r>
+            <a:r>
+              <a:rPr lang="en-US" sz="2200" b="1" dirty="0" smtClean="0">
+                <a:solidFill>
+                  <a:srgbClr val="000000"/>
+                </a:solidFill>
+                <a:latin typeface="Courier New"/>
+                <a:cs typeface="Courier New"/>
+              </a:rPr>
+              <a:t>&lt;</a:t>
+            </a:r>
+            <a:r>
+              <a:rPr lang="en-US" sz="2200" b="1" dirty="0" smtClean="0">
+                <a:solidFill>
+                  <a:srgbClr val="000000"/>
+                </a:solidFill>
+                <a:latin typeface="Courier New"/>
+                <a:cs typeface="Courier New"/>
+              </a:rPr>
+              <a:t>/code&gt;</a:t>
             </a:r>
           </a:p>
           <a:p>
@@ -5020,7 +5087,47 @@
                 <a:latin typeface="Courier New"/>
                 <a:cs typeface="Courier New"/>
               </a:rPr>
-              <a:t>  &lt;message&gt;Optional message&lt;/message&gt;</a:t>
+              <a:t>  &lt;message</a:t>
+            </a:r>
+            <a:r>
+              <a:rPr lang="en-US" sz="2200" b="1" dirty="0" smtClean="0">
+                <a:solidFill>
+                  <a:srgbClr val="000000"/>
+                </a:solidFill>
+                <a:latin typeface="Courier New"/>
+                <a:cs typeface="Courier New"/>
+              </a:rPr>
+              <a:t>&gt;</a:t>
+            </a:r>
+            <a:r>
+              <a:rPr lang="en-US" sz="2200" b="1" dirty="0" smtClean="0">
+                <a:solidFill>
+                  <a:srgbClr val="3333CC"/>
+                </a:solidFill>
+                <a:latin typeface="Courier New"/>
+                <a:cs typeface="Courier New"/>
+              </a:rPr>
+              <a:t>{Optional message}</a:t>
+            </a:r>
+            <a:r>
+              <a:rPr lang="en-US" sz="2200" b="1" dirty="0" smtClean="0">
+                <a:solidFill>
+                  <a:srgbClr val="000000"/>
+                </a:solidFill>
+                <a:latin typeface="Courier New"/>
+                <a:cs typeface="Courier New"/>
+              </a:rPr>
+              <a:t>&lt;</a:t>
+            </a:r>
+            <a:r>
+              <a:rPr lang="en-US" sz="2200" b="1" dirty="0" smtClean="0">
+                <a:solidFill>
+                  <a:srgbClr val="000000"/>
+                </a:solidFill>
+                <a:latin typeface="Courier New"/>
+                <a:cs typeface="Courier New"/>
+              </a:rPr>
+              <a:t>/message&gt;</a:t>
             </a:r>
           </a:p>
           <a:p>
@@ -5041,7 +5148,57 @@
                 <a:latin typeface="Courier New"/>
                 <a:cs typeface="Courier New"/>
               </a:rPr>
-              <a:t>  &lt;resource-id&gt;Resource ID, if available</a:t>
+              <a:t>  &lt;resource-id</a:t>
+            </a:r>
+            <a:r>
+              <a:rPr lang="en-US" sz="2200" b="1" dirty="0" smtClean="0">
+                <a:solidFill>
+                  <a:srgbClr val="000000"/>
+                </a:solidFill>
+                <a:latin typeface="Courier New"/>
+                <a:cs typeface="Courier New"/>
+              </a:rPr>
+              <a:t>&gt;</a:t>
+            </a:r>
+            <a:r>
+              <a:rPr lang="en-US" sz="2200" b="1" dirty="0" smtClean="0">
+                <a:solidFill>
+                  <a:srgbClr val="3333CC"/>
+                </a:solidFill>
+                <a:latin typeface="Courier New"/>
+                <a:cs typeface="Courier New"/>
+              </a:rPr>
+              <a:t>{Resource </a:t>
+            </a:r>
+            <a:r>
+              <a:rPr lang="en-US" sz="2200" b="1" dirty="0" smtClean="0">
+                <a:solidFill>
+                  <a:srgbClr val="3333CC"/>
+                </a:solidFill>
+                <a:latin typeface="Courier New"/>
+                <a:cs typeface="Courier New"/>
+              </a:rPr>
+              <a:t>ID, if </a:t>
+            </a:r>
+            <a:r>
+              <a:rPr lang="en-US" sz="2200" b="1" dirty="0" smtClean="0">
+                <a:solidFill>
+                  <a:srgbClr val="3333CC"/>
+                </a:solidFill>
+                <a:latin typeface="Courier New"/>
+                <a:cs typeface="Courier New"/>
+              </a:rPr>
+              <a:t>available}</a:t>
+            </a:r>
+            <a:r>
+              <a:rPr lang="en-US" sz="2200" b="1" dirty="0" smtClean="0">
+                <a:solidFill>
+                  <a:srgbClr val="000000"/>
+                </a:solidFill>
+                <a:latin typeface="Courier New"/>
+                <a:cs typeface="Courier New"/>
+              </a:rPr>
+              <a:t/>
             </a:r>
             <a:br>
               <a:rPr lang="en-US" sz="2200" b="1" dirty="0" smtClean="0">
@@ -5101,7 +5258,57 @@
                 <a:latin typeface="Courier New"/>
                 <a:cs typeface="Courier New"/>
               </a:rPr>
-              <a:t>&gt;URI of request&lt;/request-</a:t>
+              <a:t>&gt;</a:t>
+            </a:r>
+            <a:r>
+              <a:rPr lang="en-US" sz="2200" b="1" dirty="0" smtClean="0">
+                <a:solidFill>
+                  <a:srgbClr val="3333CC"/>
+                </a:solidFill>
+                <a:latin typeface="Courier New"/>
+                <a:cs typeface="Courier New"/>
+              </a:rPr>
+              <a:t>{URI </a:t>
+            </a:r>
+            <a:r>
+              <a:rPr lang="en-US" sz="2200" b="1" dirty="0" smtClean="0">
+                <a:solidFill>
+                  <a:srgbClr val="3333CC"/>
+                </a:solidFill>
+                <a:latin typeface="Courier New"/>
+                <a:cs typeface="Courier New"/>
+              </a:rPr>
+              <a:t>of </a:t>
+            </a:r>
+            <a:r>
+              <a:rPr lang="en-US" sz="2200" b="1" dirty="0" smtClean="0">
+                <a:solidFill>
+                  <a:srgbClr val="3333CC"/>
+                </a:solidFill>
+                <a:latin typeface="Courier New"/>
+                <a:cs typeface="Courier New"/>
+              </a:rPr>
+              <a:t>request}</a:t>
+            </a:r>
+            <a:r>
+              <a:rPr lang="en-US" sz="2200" b="1" dirty="0" smtClean="0">
+                <a:solidFill>
+                  <a:srgbClr val="000000"/>
+                </a:solidFill>
+                <a:latin typeface="Courier New"/>
+                <a:cs typeface="Courier New"/>
+              </a:rPr>
+              <a:t>&lt;</a:t>
+            </a:r>
+            <a:r>
+              <a:rPr lang="en-US" sz="2200" b="1" dirty="0" smtClean="0">
+                <a:solidFill>
+                  <a:srgbClr val="000000"/>
+                </a:solidFill>
+                <a:latin typeface="Courier New"/>
+                <a:cs typeface="Courier New"/>
+              </a:rPr>
+              <a:t>/request-</a:t>
             </a:r>
             <a:r>
               <a:rPr lang="en-US" sz="2200" b="1" dirty="0" err="1" smtClean="0">
@@ -7063,16 +7270,7 @@
                 </a:solidFill>
                 <a:latin typeface="Courier New" pitchFamily="80" charset="0"/>
               </a:rPr>
-              <a:t>/</a:t>
-            </a:r>
-            <a:r>
-              <a:rPr lang="en-US" sz="2400" b="1" smtClean="0">
-                <a:solidFill>
-                  <a:srgbClr val="3333CC"/>
-                </a:solidFill>
-                <a:latin typeface="Courier New" pitchFamily="80" charset="0"/>
-              </a:rPr>
-              <a:t>collectionobjects</a:t>
+              <a:t>/collectionobjects</a:t>
             </a:r>
           </a:p>
           <a:p>
@@ -7942,8 +8140,32 @@
                 </a:solidFill>
                 <a:latin typeface="Arial" pitchFamily="80" charset="0"/>
               </a:rPr>
-              <a:t>  GET a schema</a:t>
-            </a:r>
+              <a:t>  GET</a:t>
+            </a:r>
+            <a:r>
+              <a:rPr lang="en-US" sz="2800" dirty="0" smtClean="0">
+                <a:solidFill>
+                  <a:srgbClr val="000000"/>
+                </a:solidFill>
+                <a:latin typeface="Arial" pitchFamily="80" charset="0"/>
+              </a:rPr>
+              <a:t> info abou</a:t>
+            </a:r>
+            <a:r>
+              <a:rPr lang="en-US" sz="2800" dirty="0" smtClean="0">
+                <a:solidFill>
+                  <a:srgbClr val="000000"/>
+                </a:solidFill>
+                <a:latin typeface="Arial" pitchFamily="80" charset="0"/>
+              </a:rPr>
+              <a:t>t resource</a:t>
+            </a:r>
+            <a:endParaRPr lang="en-US" sz="2800" dirty="0" smtClean="0">
+              <a:solidFill>
+                <a:srgbClr val="000000"/>
+              </a:solidFill>
+              <a:latin typeface="Arial" pitchFamily="80" charset="0"/>
+            </a:endParaRPr>
           </a:p>
           <a:p>
             <a:pPr>
@@ -7971,26 +8193,65 @@
                 </a:solidFill>
                 <a:latin typeface="Courier New" pitchFamily="80" charset="0"/>
               </a:rPr>
-              <a:t>GET /collectionobjects/schema</a:t>
-            </a:r>
-            <a:br>
+              <a:t>GET /collectionobjects/</a:t>
+            </a:r>
+            <a:r>
               <a:rPr lang="en-US" sz="2400" b="1" dirty="0" smtClean="0">
                 <a:solidFill>
                   <a:srgbClr val="3333CC"/>
                 </a:solidFill>
                 <a:latin typeface="Courier New" pitchFamily="80" charset="0"/>
               </a:rPr>
-            </a:br>
-            <a:r>
-              <a:rPr lang="en-US" sz="2000" dirty="0" smtClean="0">
-                <a:solidFill>
-                  <a:srgbClr val="000000"/>
-                </a:solidFill>
-                <a:latin typeface="Arial" pitchFamily="80" charset="0"/>
-              </a:rPr>
-              <a:t>(Others needed?)</a:t>
-            </a:r>
-            <a:endParaRPr lang="en-US" sz="2000" b="1" dirty="0" smtClean="0">
+              <a:t>schema</a:t>
+            </a:r>
+          </a:p>
+          <a:p>
+            <a:pPr>
+              <a:lnSpc>
+                <a:spcPct val="95000"/>
+              </a:lnSpc>
+              <a:spcBef>
+                <a:spcPct val="0"/>
+              </a:spcBef>
+              <a:buNone/>
+            </a:pPr>
+            <a:r>
+              <a:rPr lang="en-US" sz="2400" b="1" dirty="0" smtClean="0">
+                <a:solidFill>
+                  <a:srgbClr val="3333CC"/>
+                </a:solidFill>
+                <a:latin typeface="Courier New" pitchFamily="80" charset="0"/>
+              </a:rPr>
+              <a:t>	GET </a:t>
+            </a:r>
+            <a:r>
+              <a:rPr lang="en-US" sz="2400" b="1" dirty="0" smtClean="0">
+                <a:solidFill>
+                  <a:srgbClr val="3333CC"/>
+                </a:solidFill>
+                <a:latin typeface="Courier New" pitchFamily="80" charset="0"/>
+              </a:rPr>
+              <a:t>/</a:t>
+            </a:r>
+            <a:r>
+              <a:rPr lang="en-US" sz="2400" b="1" dirty="0" err="1" smtClean="0">
+                <a:solidFill>
+                  <a:srgbClr val="3333CC"/>
+                </a:solidFill>
+                <a:latin typeface="Courier New" pitchFamily="80" charset="0"/>
+              </a:rPr>
+              <a:t>collectionobjects</a:t>
+            </a:r>
+            <a:r>
+              <a:rPr lang="en-US" sz="2400" b="1" dirty="0" smtClean="0">
+                <a:solidFill>
+                  <a:srgbClr val="3333CC"/>
+                </a:solidFill>
+                <a:latin typeface="Courier New" pitchFamily="80" charset="0"/>
+              </a:rPr>
+              <a:t>/description</a:t>
+            </a:r>
+            <a:endParaRPr lang="en-US" sz="2400" b="1" dirty="0" smtClean="0">
               <a:solidFill>
                 <a:srgbClr val="3333CC"/>
               </a:solidFill>
@@ -8288,7 +8549,25 @@
                 </a:solidFill>
                 <a:latin typeface="Arial" pitchFamily="80" charset="0"/>
               </a:rPr>
-              <a:t>	•	Fully-specified search</a:t>
+              <a:t>	</a:t>
+            </a:r>
+            <a:r>
+              <a:rPr lang="en-US" sz="2400" dirty="0" smtClean="0">
+                <a:solidFill>
+                  <a:srgbClr val="000000"/>
+                </a:solidFill>
+                <a:latin typeface="Arial" pitchFamily="80" charset="0"/>
+              </a:rPr>
+              <a:t>•	Fully</a:t>
+            </a:r>
+            <a:r>
+              <a:rPr lang="en-US" sz="2400" dirty="0" smtClean="0">
+                <a:solidFill>
+                  <a:srgbClr val="000000"/>
+                </a:solidFill>
+                <a:latin typeface="Arial" pitchFamily="80" charset="0"/>
+              </a:rPr>
+              <a:t>-specified search</a:t>
             </a:r>
           </a:p>
           <a:p>

</xml_diff>

<commit_message>
NOJIRA Fixed a trivial typo in slides for Toronto presentation on REST-based APIs: 'DELETE' rather than 'GET' method for delete operation.
</commit_message>
<xml_diff>
--- a/docs/allteam-061409-toronto/Toronto_Services_REST_APIs.pptx
+++ b/docs/allteam-061409-toronto/Toronto_Services_REST_APIs.pptx
@@ -4449,16 +4449,7 @@
                 </a:solidFill>
                 <a:latin typeface="Arial" pitchFamily="80" charset="0"/>
               </a:rPr>
-              <a:t>thus be saved, shared </a:t>
-            </a:r>
-            <a:r>
-              <a:rPr lang="en-US" sz="2400" dirty="0" smtClean="0">
-                <a:solidFill>
-                  <a:srgbClr val="000000"/>
-                </a:solidFill>
-                <a:latin typeface="Arial" pitchFamily="80" charset="0"/>
-              </a:rPr>
-              <a:t>…</a:t>
+              <a:t>thus be saved, shared …</a:t>
             </a:r>
           </a:p>
         </p:txBody>
@@ -5026,47 +5017,27 @@
                 <a:latin typeface="Courier New"/>
                 <a:cs typeface="Courier New"/>
               </a:rPr>
-              <a:t>  &lt;code</a:t>
+              <a:t>  &lt;code&gt;</a:t>
             </a:r>
             <a:r>
               <a:rPr lang="en-US" sz="2200" b="1" dirty="0" smtClean="0">
                 <a:solidFill>
-                  <a:srgbClr val="000000"/>
+                  <a:srgbClr val="3333CC"/>
                 </a:solidFill>
                 <a:latin typeface="Courier New"/>
                 <a:cs typeface="Courier New"/>
               </a:rPr>
-              <a:t>&gt;</a:t>
+              <a:t>{Mandatory code}</a:t>
             </a:r>
             <a:r>
               <a:rPr lang="en-US" sz="2200" b="1" dirty="0" smtClean="0">
                 <a:solidFill>
-                  <a:srgbClr val="3333CC"/>
+                  <a:srgbClr val="000000"/>
                 </a:solidFill>
                 <a:latin typeface="Courier New"/>
                 <a:cs typeface="Courier New"/>
               </a:rPr>
-              <a:t>{Mandatory code}</a:t>
-            </a:r>
-            <a:r>
-              <a:rPr lang="en-US" sz="2200" b="1" dirty="0" smtClean="0">
-                <a:solidFill>
-                  <a:srgbClr val="000000"/>
-                </a:solidFill>
-                <a:latin typeface="Courier New"/>
-                <a:cs typeface="Courier New"/>
-              </a:rPr>
-              <a:t>&lt;</a:t>
-            </a:r>
-            <a:r>
-              <a:rPr lang="en-US" sz="2200" b="1" dirty="0" smtClean="0">
-                <a:solidFill>
-                  <a:srgbClr val="000000"/>
-                </a:solidFill>
-                <a:latin typeface="Courier New"/>
-                <a:cs typeface="Courier New"/>
-              </a:rPr>
-              <a:t>/code&gt;</a:t>
+              <a:t>&lt;/code&gt;</a:t>
             </a:r>
           </a:p>
           <a:p>
@@ -5087,47 +5058,27 @@
                 <a:latin typeface="Courier New"/>
                 <a:cs typeface="Courier New"/>
               </a:rPr>
-              <a:t>  &lt;message</a:t>
+              <a:t>  &lt;message&gt;</a:t>
             </a:r>
             <a:r>
               <a:rPr lang="en-US" sz="2200" b="1" dirty="0" smtClean="0">
                 <a:solidFill>
-                  <a:srgbClr val="000000"/>
+                  <a:srgbClr val="3333CC"/>
                 </a:solidFill>
                 <a:latin typeface="Courier New"/>
                 <a:cs typeface="Courier New"/>
               </a:rPr>
-              <a:t>&gt;</a:t>
+              <a:t>{Optional message}</a:t>
             </a:r>
             <a:r>
               <a:rPr lang="en-US" sz="2200" b="1" dirty="0" smtClean="0">
                 <a:solidFill>
-                  <a:srgbClr val="3333CC"/>
+                  <a:srgbClr val="000000"/>
                 </a:solidFill>
                 <a:latin typeface="Courier New"/>
                 <a:cs typeface="Courier New"/>
               </a:rPr>
-              <a:t>{Optional message}</a:t>
-            </a:r>
-            <a:r>
-              <a:rPr lang="en-US" sz="2200" b="1" dirty="0" smtClean="0">
-                <a:solidFill>
-                  <a:srgbClr val="000000"/>
-                </a:solidFill>
-                <a:latin typeface="Courier New"/>
-                <a:cs typeface="Courier New"/>
-              </a:rPr>
-              <a:t>&lt;</a:t>
-            </a:r>
-            <a:r>
-              <a:rPr lang="en-US" sz="2200" b="1" dirty="0" smtClean="0">
-                <a:solidFill>
-                  <a:srgbClr val="000000"/>
-                </a:solidFill>
-                <a:latin typeface="Courier New"/>
-                <a:cs typeface="Courier New"/>
-              </a:rPr>
-              <a:t>/message&gt;</a:t>
+              <a:t>&lt;/message&gt;</a:t>
             </a:r>
           </a:p>
           <a:p>
@@ -5148,47 +5099,17 @@
                 <a:latin typeface="Courier New"/>
                 <a:cs typeface="Courier New"/>
               </a:rPr>
-              <a:t>  &lt;resource-id</a:t>
+              <a:t>  &lt;resource-id&gt;</a:t>
             </a:r>
             <a:r>
               <a:rPr lang="en-US" sz="2200" b="1" dirty="0" smtClean="0">
                 <a:solidFill>
-                  <a:srgbClr val="000000"/>
+                  <a:srgbClr val="3333CC"/>
                 </a:solidFill>
                 <a:latin typeface="Courier New"/>
                 <a:cs typeface="Courier New"/>
               </a:rPr>
-              <a:t>&gt;</a:t>
-            </a:r>
-            <a:r>
-              <a:rPr lang="en-US" sz="2200" b="1" dirty="0" smtClean="0">
-                <a:solidFill>
-                  <a:srgbClr val="3333CC"/>
-                </a:solidFill>
-                <a:latin typeface="Courier New"/>
-                <a:cs typeface="Courier New"/>
-              </a:rPr>
-              <a:t>{Resource </a:t>
-            </a:r>
-            <a:r>
-              <a:rPr lang="en-US" sz="2200" b="1" dirty="0" smtClean="0">
-                <a:solidFill>
-                  <a:srgbClr val="3333CC"/>
-                </a:solidFill>
-                <a:latin typeface="Courier New"/>
-                <a:cs typeface="Courier New"/>
-              </a:rPr>
-              <a:t>ID, if </a:t>
-            </a:r>
-            <a:r>
-              <a:rPr lang="en-US" sz="2200" b="1" dirty="0" smtClean="0">
-                <a:solidFill>
-                  <a:srgbClr val="3333CC"/>
-                </a:solidFill>
-                <a:latin typeface="Courier New"/>
-                <a:cs typeface="Courier New"/>
-              </a:rPr>
-              <a:t>available}</a:t>
+              <a:t>{Resource ID, if available}</a:t>
             </a:r>
             <a:r>
               <a:rPr lang="en-US" sz="2200" b="1" dirty="0" smtClean="0">
@@ -5268,47 +5189,17 @@
                 <a:latin typeface="Courier New"/>
                 <a:cs typeface="Courier New"/>
               </a:rPr>
-              <a:t>{URI </a:t>
+              <a:t>{URI of request}</a:t>
             </a:r>
             <a:r>
               <a:rPr lang="en-US" sz="2200" b="1" dirty="0" smtClean="0">
                 <a:solidFill>
-                  <a:srgbClr val="3333CC"/>
+                  <a:srgbClr val="000000"/>
                 </a:solidFill>
                 <a:latin typeface="Courier New"/>
                 <a:cs typeface="Courier New"/>
               </a:rPr>
-              <a:t>of </a:t>
-            </a:r>
-            <a:r>
-              <a:rPr lang="en-US" sz="2200" b="1" dirty="0" smtClean="0">
-                <a:solidFill>
-                  <a:srgbClr val="3333CC"/>
-                </a:solidFill>
-                <a:latin typeface="Courier New"/>
-                <a:cs typeface="Courier New"/>
-              </a:rPr>
-              <a:t>request}</a:t>
-            </a:r>
-            <a:r>
-              <a:rPr lang="en-US" sz="2200" b="1" dirty="0" smtClean="0">
-                <a:solidFill>
-                  <a:srgbClr val="000000"/>
-                </a:solidFill>
-                <a:latin typeface="Courier New"/>
-                <a:cs typeface="Courier New"/>
-              </a:rPr>
-              <a:t>&lt;</a:t>
-            </a:r>
-            <a:r>
-              <a:rPr lang="en-US" sz="2200" b="1" dirty="0" smtClean="0">
-                <a:solidFill>
-                  <a:srgbClr val="000000"/>
-                </a:solidFill>
-                <a:latin typeface="Courier New"/>
-                <a:cs typeface="Courier New"/>
-              </a:rPr>
-              <a:t>/request-</a:t>
+              <a:t>&lt;/request-</a:t>
             </a:r>
             <a:r>
               <a:rPr lang="en-US" sz="2200" b="1" dirty="0" err="1" smtClean="0">
@@ -8073,7 +7964,7 @@
               <a:buNone/>
             </a:pPr>
             <a:r>
-              <a:rPr lang="en-US" sz="2800" b="1" dirty="0" smtClean="0">
+              <a:rPr lang="en-US" sz="2800" b="1" smtClean="0">
                 <a:solidFill>
                   <a:srgbClr val="000000"/>
                 </a:solidFill>
@@ -8082,13 +7973,22 @@
               <a:t>	</a:t>
             </a:r>
             <a:r>
+              <a:rPr lang="en-US" sz="2400" b="1" smtClean="0">
+                <a:solidFill>
+                  <a:srgbClr val="3333CC"/>
+                </a:solidFill>
+                <a:latin typeface="Courier New" pitchFamily="80" charset="0"/>
+              </a:rPr>
+              <a:t>DELETE /</a:t>
+            </a:r>
+            <a:r>
               <a:rPr lang="en-US" sz="2400" b="1" dirty="0" smtClean="0">
                 <a:solidFill>
                   <a:srgbClr val="3333CC"/>
                 </a:solidFill>
                 <a:latin typeface="Courier New" pitchFamily="80" charset="0"/>
               </a:rPr>
-              <a:t>GET /collectionobjects/{id}</a:t>
+              <a:t>collectionobjects/{id}</a:t>
             </a:r>
             <a:endParaRPr lang="en-US" sz="2800" dirty="0" smtClean="0">
               <a:solidFill>
@@ -8140,32 +8040,8 @@
                 </a:solidFill>
                 <a:latin typeface="Arial" pitchFamily="80" charset="0"/>
               </a:rPr>
-              <a:t>  GET</a:t>
-            </a:r>
-            <a:r>
-              <a:rPr lang="en-US" sz="2800" dirty="0" smtClean="0">
-                <a:solidFill>
-                  <a:srgbClr val="000000"/>
-                </a:solidFill>
-                <a:latin typeface="Arial" pitchFamily="80" charset="0"/>
-              </a:rPr>
-              <a:t> info abou</a:t>
-            </a:r>
-            <a:r>
-              <a:rPr lang="en-US" sz="2800" dirty="0" smtClean="0">
-                <a:solidFill>
-                  <a:srgbClr val="000000"/>
-                </a:solidFill>
-                <a:latin typeface="Arial" pitchFamily="80" charset="0"/>
-              </a:rPr>
-              <a:t>t resource</a:t>
-            </a:r>
-            <a:endParaRPr lang="en-US" sz="2800" dirty="0" smtClean="0">
-              <a:solidFill>
-                <a:srgbClr val="000000"/>
-              </a:solidFill>
-              <a:latin typeface="Arial" pitchFamily="80" charset="0"/>
-            </a:endParaRPr>
+              <a:t>  GET info about resource</a:t>
+            </a:r>
           </a:p>
           <a:p>
             <a:pPr>
@@ -8193,16 +8069,7 @@
                 </a:solidFill>
                 <a:latin typeface="Courier New" pitchFamily="80" charset="0"/>
               </a:rPr>
-              <a:t>GET /collectionobjects/</a:t>
-            </a:r>
-            <a:r>
-              <a:rPr lang="en-US" sz="2400" b="1" dirty="0" smtClean="0">
-                <a:solidFill>
-                  <a:srgbClr val="3333CC"/>
-                </a:solidFill>
-                <a:latin typeface="Courier New" pitchFamily="80" charset="0"/>
-              </a:rPr>
-              <a:t>schema</a:t>
+              <a:t>GET /collectionobjects/schema</a:t>
             </a:r>
           </a:p>
           <a:p>
@@ -8222,7 +8089,16 @@
                 </a:solidFill>
                 <a:latin typeface="Courier New" pitchFamily="80" charset="0"/>
               </a:rPr>
-              <a:t>	GET </a:t>
+              <a:t>	GET /</a:t>
+            </a:r>
+            <a:r>
+              <a:rPr lang="en-US" sz="2400" b="1" dirty="0" err="1" smtClean="0">
+                <a:solidFill>
+                  <a:srgbClr val="3333CC"/>
+                </a:solidFill>
+                <a:latin typeface="Courier New" pitchFamily="80" charset="0"/>
+              </a:rPr>
+              <a:t>collectionobjects</a:t>
             </a:r>
             <a:r>
               <a:rPr lang="en-US" sz="2400" b="1" dirty="0" smtClean="0">
@@ -8231,32 +8107,8 @@
                 </a:solidFill>
                 <a:latin typeface="Courier New" pitchFamily="80" charset="0"/>
               </a:rPr>
-              <a:t>/</a:t>
-            </a:r>
-            <a:r>
-              <a:rPr lang="en-US" sz="2400" b="1" dirty="0" err="1" smtClean="0">
-                <a:solidFill>
-                  <a:srgbClr val="3333CC"/>
-                </a:solidFill>
-                <a:latin typeface="Courier New" pitchFamily="80" charset="0"/>
-              </a:rPr>
-              <a:t>collectionobjects</a:t>
-            </a:r>
-            <a:r>
-              <a:rPr lang="en-US" sz="2400" b="1" dirty="0" smtClean="0">
-                <a:solidFill>
-                  <a:srgbClr val="3333CC"/>
-                </a:solidFill>
-                <a:latin typeface="Courier New" pitchFamily="80" charset="0"/>
-              </a:rPr>
               <a:t>/description</a:t>
             </a:r>
-            <a:endParaRPr lang="en-US" sz="2400" b="1" dirty="0" smtClean="0">
-              <a:solidFill>
-                <a:srgbClr val="3333CC"/>
-              </a:solidFill>
-              <a:latin typeface="Courier New" pitchFamily="80" charset="0"/>
-            </a:endParaRPr>
           </a:p>
         </p:txBody>
       </p:sp>
@@ -8549,25 +8401,7 @@
                 </a:solidFill>
                 <a:latin typeface="Arial" pitchFamily="80" charset="0"/>
               </a:rPr>
-              <a:t>	</a:t>
-            </a:r>
-            <a:r>
-              <a:rPr lang="en-US" sz="2400" dirty="0" smtClean="0">
-                <a:solidFill>
-                  <a:srgbClr val="000000"/>
-                </a:solidFill>
-                <a:latin typeface="Arial" pitchFamily="80" charset="0"/>
-              </a:rPr>
-              <a:t>•	Fully</a:t>
-            </a:r>
-            <a:r>
-              <a:rPr lang="en-US" sz="2400" dirty="0" smtClean="0">
-                <a:solidFill>
-                  <a:srgbClr val="000000"/>
-                </a:solidFill>
-                <a:latin typeface="Arial" pitchFamily="80" charset="0"/>
-              </a:rPr>
-              <a:t>-specified search</a:t>
+              <a:t>	•	Fully-specified search</a:t>
             </a:r>
           </a:p>
           <a:p>

</xml_diff>